<commit_message>
update figures - 1.28
</commit_message>
<xml_diff>
--- a/Figures/figures.pptx
+++ b/Figures/figures.pptx
@@ -11,8 +11,10 @@
     <p:sldId id="259" r:id="rId5"/>
     <p:sldId id="261" r:id="rId6"/>
     <p:sldId id="260" r:id="rId7"/>
-    <p:sldId id="262" r:id="rId8"/>
-    <p:sldId id="263" r:id="rId9"/>
+    <p:sldId id="264" r:id="rId8"/>
+    <p:sldId id="262" r:id="rId9"/>
+    <p:sldId id="265" r:id="rId10"/>
+    <p:sldId id="263" r:id="rId11"/>
   </p:sldIdLst>
   <p:sldSz cx="12192000" cy="6858000"/>
   <p:notesSz cx="6858000" cy="9144000"/>
@@ -248,7 +250,7 @@
           <a:p>
             <a:fld id="{E0B8E1AC-92D5-41B2-8B41-6A01DF117C07}" type="datetimeFigureOut">
               <a:rPr lang="zh-CN" altLang="en-US" smtClean="0"/>
-              <a:t>2023/1/22</a:t>
+              <a:t>2023/1/27</a:t>
             </a:fld>
             <a:endParaRPr lang="zh-CN" altLang="en-US"/>
           </a:p>
@@ -416,7 +418,7 @@
           <a:p>
             <a:fld id="{E0B8E1AC-92D5-41B2-8B41-6A01DF117C07}" type="datetimeFigureOut">
               <a:rPr lang="zh-CN" altLang="en-US" smtClean="0"/>
-              <a:t>2023/1/22</a:t>
+              <a:t>2023/1/27</a:t>
             </a:fld>
             <a:endParaRPr lang="zh-CN" altLang="en-US"/>
           </a:p>
@@ -594,7 +596,7 @@
           <a:p>
             <a:fld id="{E0B8E1AC-92D5-41B2-8B41-6A01DF117C07}" type="datetimeFigureOut">
               <a:rPr lang="zh-CN" altLang="en-US" smtClean="0"/>
-              <a:t>2023/1/22</a:t>
+              <a:t>2023/1/27</a:t>
             </a:fld>
             <a:endParaRPr lang="zh-CN" altLang="en-US"/>
           </a:p>
@@ -762,7 +764,7 @@
           <a:p>
             <a:fld id="{E0B8E1AC-92D5-41B2-8B41-6A01DF117C07}" type="datetimeFigureOut">
               <a:rPr lang="zh-CN" altLang="en-US" smtClean="0"/>
-              <a:t>2023/1/22</a:t>
+              <a:t>2023/1/27</a:t>
             </a:fld>
             <a:endParaRPr lang="zh-CN" altLang="en-US"/>
           </a:p>
@@ -1007,7 +1009,7 @@
           <a:p>
             <a:fld id="{E0B8E1AC-92D5-41B2-8B41-6A01DF117C07}" type="datetimeFigureOut">
               <a:rPr lang="zh-CN" altLang="en-US" smtClean="0"/>
-              <a:t>2023/1/22</a:t>
+              <a:t>2023/1/27</a:t>
             </a:fld>
             <a:endParaRPr lang="zh-CN" altLang="en-US"/>
           </a:p>
@@ -1236,7 +1238,7 @@
           <a:p>
             <a:fld id="{E0B8E1AC-92D5-41B2-8B41-6A01DF117C07}" type="datetimeFigureOut">
               <a:rPr lang="zh-CN" altLang="en-US" smtClean="0"/>
-              <a:t>2023/1/22</a:t>
+              <a:t>2023/1/27</a:t>
             </a:fld>
             <a:endParaRPr lang="zh-CN" altLang="en-US"/>
           </a:p>
@@ -1600,7 +1602,7 @@
           <a:p>
             <a:fld id="{E0B8E1AC-92D5-41B2-8B41-6A01DF117C07}" type="datetimeFigureOut">
               <a:rPr lang="zh-CN" altLang="en-US" smtClean="0"/>
-              <a:t>2023/1/22</a:t>
+              <a:t>2023/1/27</a:t>
             </a:fld>
             <a:endParaRPr lang="zh-CN" altLang="en-US"/>
           </a:p>
@@ -1717,7 +1719,7 @@
           <a:p>
             <a:fld id="{E0B8E1AC-92D5-41B2-8B41-6A01DF117C07}" type="datetimeFigureOut">
               <a:rPr lang="zh-CN" altLang="en-US" smtClean="0"/>
-              <a:t>2023/1/22</a:t>
+              <a:t>2023/1/27</a:t>
             </a:fld>
             <a:endParaRPr lang="zh-CN" altLang="en-US"/>
           </a:p>
@@ -1812,7 +1814,7 @@
           <a:p>
             <a:fld id="{E0B8E1AC-92D5-41B2-8B41-6A01DF117C07}" type="datetimeFigureOut">
               <a:rPr lang="zh-CN" altLang="en-US" smtClean="0"/>
-              <a:t>2023/1/22</a:t>
+              <a:t>2023/1/27</a:t>
             </a:fld>
             <a:endParaRPr lang="zh-CN" altLang="en-US"/>
           </a:p>
@@ -2087,7 +2089,7 @@
           <a:p>
             <a:fld id="{E0B8E1AC-92D5-41B2-8B41-6A01DF117C07}" type="datetimeFigureOut">
               <a:rPr lang="zh-CN" altLang="en-US" smtClean="0"/>
-              <a:t>2023/1/22</a:t>
+              <a:t>2023/1/27</a:t>
             </a:fld>
             <a:endParaRPr lang="zh-CN" altLang="en-US"/>
           </a:p>
@@ -2339,7 +2341,7 @@
           <a:p>
             <a:fld id="{E0B8E1AC-92D5-41B2-8B41-6A01DF117C07}" type="datetimeFigureOut">
               <a:rPr lang="zh-CN" altLang="en-US" smtClean="0"/>
-              <a:t>2023/1/22</a:t>
+              <a:t>2023/1/27</a:t>
             </a:fld>
             <a:endParaRPr lang="zh-CN" altLang="en-US"/>
           </a:p>
@@ -2550,7 +2552,7 @@
           <a:p>
             <a:fld id="{E0B8E1AC-92D5-41B2-8B41-6A01DF117C07}" type="datetimeFigureOut">
               <a:rPr lang="zh-CN" altLang="en-US" smtClean="0"/>
-              <a:t>2023/1/22</a:t>
+              <a:t>2023/1/27</a:t>
             </a:fld>
             <a:endParaRPr lang="zh-CN" altLang="en-US"/>
           </a:p>
@@ -3042,6 +3044,176 @@
 </p:sld>
 </file>
 
+<file path=ppt/slides/slide10.xml><?xml version="1.0" encoding="utf-8"?>
+<p:sld xmlns:a="http://schemas.openxmlformats.org/drawingml/2006/main" xmlns:r="http://schemas.openxmlformats.org/officeDocument/2006/relationships" xmlns:p="http://schemas.openxmlformats.org/presentationml/2006/main">
+  <p:cSld>
+    <p:spTree>
+      <p:nvGrpSpPr>
+        <p:cNvPr id="1" name=""/>
+        <p:cNvGrpSpPr/>
+        <p:nvPr/>
+      </p:nvGrpSpPr>
+      <p:grpSpPr>
+        <a:xfrm>
+          <a:off x="0" y="0"/>
+          <a:ext cx="0" cy="0"/>
+          <a:chOff x="0" y="0"/>
+          <a:chExt cx="0" cy="0"/>
+        </a:xfrm>
+      </p:grpSpPr>
+      <p:sp>
+        <p:nvSpPr>
+          <p:cNvPr id="7" name="文本框 6"/>
+          <p:cNvSpPr txBox="1"/>
+          <p:nvPr/>
+        </p:nvSpPr>
+        <p:spPr>
+          <a:xfrm>
+            <a:off x="1236371" y="394448"/>
+            <a:ext cx="9777036" cy="369332"/>
+          </a:xfrm>
+          <a:prstGeom prst="rect">
+            <a:avLst/>
+          </a:prstGeom>
+          <a:noFill/>
+        </p:spPr>
+        <p:txBody>
+          <a:bodyPr wrap="none" rtlCol="0">
+            <a:spAutoFit/>
+          </a:bodyPr>
+          <a:lstStyle/>
+          <a:p>
+            <a:pPr algn="ctr"/>
+            <a:r>
+              <a:rPr lang="en-US" altLang="zh-CN" dirty="0">
+                <a:latin typeface="Arial" panose="020B0604020202020204" pitchFamily="34" charset="0"/>
+                <a:cs typeface="Arial" panose="020B0604020202020204" pitchFamily="34" charset="0"/>
+              </a:rPr>
+              <a:t>Figure 6. Disturbances in the circadian clock lead to worse infection outcomes</a:t>
+            </a:r>
+            <a:r>
+              <a:rPr lang="en-US" altLang="zh-CN" dirty="0" smtClean="0">
+                <a:latin typeface="Arial" panose="020B0604020202020204" pitchFamily="34" charset="0"/>
+                <a:cs typeface="Arial" panose="020B0604020202020204" pitchFamily="34" charset="0"/>
+              </a:rPr>
+              <a:t>. – SARS-Cov-2</a:t>
+            </a:r>
+            <a:endParaRPr lang="zh-CN" altLang="en-US" dirty="0">
+              <a:latin typeface="Arial" panose="020B0604020202020204" pitchFamily="34" charset="0"/>
+              <a:cs typeface="Arial" panose="020B0604020202020204" pitchFamily="34" charset="0"/>
+            </a:endParaRPr>
+          </a:p>
+        </p:txBody>
+      </p:sp>
+      <p:pic>
+        <p:nvPicPr>
+          <p:cNvPr id="6" name="图片 5"/>
+          <p:cNvPicPr>
+            <a:picLocks noChangeAspect="1"/>
+          </p:cNvPicPr>
+          <p:nvPr/>
+        </p:nvPicPr>
+        <p:blipFill>
+          <a:blip r:embed="rId2"/>
+          <a:stretch>
+            <a:fillRect/>
+          </a:stretch>
+        </p:blipFill>
+        <p:spPr>
+          <a:xfrm>
+            <a:off x="2611759" y="1104781"/>
+            <a:ext cx="3657600" cy="2752721"/>
+          </a:xfrm>
+          <a:prstGeom prst="rect">
+            <a:avLst/>
+          </a:prstGeom>
+        </p:spPr>
+      </p:pic>
+      <p:pic>
+        <p:nvPicPr>
+          <p:cNvPr id="8" name="图片 7"/>
+          <p:cNvPicPr>
+            <a:picLocks noChangeAspect="1"/>
+          </p:cNvPicPr>
+          <p:nvPr/>
+        </p:nvPicPr>
+        <p:blipFill>
+          <a:blip r:embed="rId3"/>
+          <a:stretch>
+            <a:fillRect/>
+          </a:stretch>
+        </p:blipFill>
+        <p:spPr>
+          <a:xfrm>
+            <a:off x="6269359" y="1104781"/>
+            <a:ext cx="3657600" cy="2752721"/>
+          </a:xfrm>
+          <a:prstGeom prst="rect">
+            <a:avLst/>
+          </a:prstGeom>
+        </p:spPr>
+      </p:pic>
+      <p:pic>
+        <p:nvPicPr>
+          <p:cNvPr id="9" name="图片 8"/>
+          <p:cNvPicPr>
+            <a:picLocks noChangeAspect="1"/>
+          </p:cNvPicPr>
+          <p:nvPr/>
+        </p:nvPicPr>
+        <p:blipFill>
+          <a:blip r:embed="rId4"/>
+          <a:stretch>
+            <a:fillRect/>
+          </a:stretch>
+        </p:blipFill>
+        <p:spPr>
+          <a:xfrm>
+            <a:off x="2611759" y="3857502"/>
+            <a:ext cx="3657600" cy="2752721"/>
+          </a:xfrm>
+          <a:prstGeom prst="rect">
+            <a:avLst/>
+          </a:prstGeom>
+        </p:spPr>
+      </p:pic>
+      <p:pic>
+        <p:nvPicPr>
+          <p:cNvPr id="10" name="图片 9"/>
+          <p:cNvPicPr>
+            <a:picLocks noChangeAspect="1"/>
+          </p:cNvPicPr>
+          <p:nvPr/>
+        </p:nvPicPr>
+        <p:blipFill>
+          <a:blip r:embed="rId5"/>
+          <a:stretch>
+            <a:fillRect/>
+          </a:stretch>
+        </p:blipFill>
+        <p:spPr>
+          <a:xfrm>
+            <a:off x="6269359" y="3918508"/>
+            <a:ext cx="3657600" cy="2752721"/>
+          </a:xfrm>
+          <a:prstGeom prst="rect">
+            <a:avLst/>
+          </a:prstGeom>
+        </p:spPr>
+      </p:pic>
+    </p:spTree>
+    <p:extLst>
+      <p:ext uri="{BB962C8B-B14F-4D97-AF65-F5344CB8AC3E}">
+        <p14:creationId xmlns:p14="http://schemas.microsoft.com/office/powerpoint/2010/main" val="4038387648"/>
+      </p:ext>
+    </p:extLst>
+  </p:cSld>
+  <p:clrMapOvr>
+    <a:masterClrMapping/>
+  </p:clrMapOvr>
+</p:sld>
+</file>
+
 <file path=ppt/slides/slide2.xml><?xml version="1.0" encoding="utf-8"?>
 <p:sld xmlns:a="http://schemas.openxmlformats.org/drawingml/2006/main" xmlns:r="http://schemas.openxmlformats.org/officeDocument/2006/relationships" xmlns:p="http://schemas.openxmlformats.org/presentationml/2006/main">
   <p:cSld>
@@ -3112,28 +3284,142 @@
       </p:sp>
       <p:pic>
         <p:nvPicPr>
-          <p:cNvPr id="3" name="图片 2"/>
+          <p:cNvPr id="2" name="图片 1"/>
           <p:cNvPicPr>
             <a:picLocks noChangeAspect="1"/>
           </p:cNvPicPr>
           <p:nvPr/>
         </p:nvPicPr>
         <p:blipFill>
-          <a:blip r:embed="rId2">
-            <a:extLst>
-              <a:ext uri="{28A0092B-C50C-407E-A947-70E740481C1C}">
-                <a14:useLocalDpi xmlns:a14="http://schemas.microsoft.com/office/drawing/2010/main" val="0"/>
-              </a:ext>
-            </a:extLst>
-          </a:blip>
+          <a:blip r:embed="rId2"/>
           <a:stretch>
             <a:fillRect/>
           </a:stretch>
         </p:blipFill>
         <p:spPr>
           <a:xfrm>
-            <a:off x="2467263" y="905241"/>
-            <a:ext cx="7315200" cy="5488335"/>
+            <a:off x="3338719" y="763780"/>
+            <a:ext cx="2432304" cy="1830559"/>
+          </a:xfrm>
+          <a:prstGeom prst="rect">
+            <a:avLst/>
+          </a:prstGeom>
+        </p:spPr>
+      </p:pic>
+      <p:pic>
+        <p:nvPicPr>
+          <p:cNvPr id="4" name="图片 3"/>
+          <p:cNvPicPr>
+            <a:picLocks noChangeAspect="1"/>
+          </p:cNvPicPr>
+          <p:nvPr/>
+        </p:nvPicPr>
+        <p:blipFill>
+          <a:blip r:embed="rId3"/>
+          <a:stretch>
+            <a:fillRect/>
+          </a:stretch>
+        </p:blipFill>
+        <p:spPr>
+          <a:xfrm>
+            <a:off x="5996786" y="763780"/>
+            <a:ext cx="2432304" cy="1830559"/>
+          </a:xfrm>
+          <a:prstGeom prst="rect">
+            <a:avLst/>
+          </a:prstGeom>
+        </p:spPr>
+      </p:pic>
+      <p:pic>
+        <p:nvPicPr>
+          <p:cNvPr id="5" name="图片 4"/>
+          <p:cNvPicPr>
+            <a:picLocks noChangeAspect="1"/>
+          </p:cNvPicPr>
+          <p:nvPr/>
+        </p:nvPicPr>
+        <p:blipFill>
+          <a:blip r:embed="rId4"/>
+          <a:stretch>
+            <a:fillRect/>
+          </a:stretch>
+        </p:blipFill>
+        <p:spPr>
+          <a:xfrm>
+            <a:off x="3236013" y="2726973"/>
+            <a:ext cx="2432304" cy="1830559"/>
+          </a:xfrm>
+          <a:prstGeom prst="rect">
+            <a:avLst/>
+          </a:prstGeom>
+        </p:spPr>
+      </p:pic>
+      <p:pic>
+        <p:nvPicPr>
+          <p:cNvPr id="6" name="图片 5"/>
+          <p:cNvPicPr>
+            <a:picLocks noChangeAspect="1"/>
+          </p:cNvPicPr>
+          <p:nvPr/>
+        </p:nvPicPr>
+        <p:blipFill>
+          <a:blip r:embed="rId5"/>
+          <a:stretch>
+            <a:fillRect/>
+          </a:stretch>
+        </p:blipFill>
+        <p:spPr>
+          <a:xfrm>
+            <a:off x="5996786" y="2726973"/>
+            <a:ext cx="2432304" cy="1830559"/>
+          </a:xfrm>
+          <a:prstGeom prst="rect">
+            <a:avLst/>
+          </a:prstGeom>
+        </p:spPr>
+      </p:pic>
+      <p:pic>
+        <p:nvPicPr>
+          <p:cNvPr id="7" name="图片 6"/>
+          <p:cNvPicPr>
+            <a:picLocks noChangeAspect="1"/>
+          </p:cNvPicPr>
+          <p:nvPr/>
+        </p:nvPicPr>
+        <p:blipFill>
+          <a:blip r:embed="rId6"/>
+          <a:stretch>
+            <a:fillRect/>
+          </a:stretch>
+        </p:blipFill>
+        <p:spPr>
+          <a:xfrm>
+            <a:off x="3236667" y="4690168"/>
+            <a:ext cx="2431650" cy="1830067"/>
+          </a:xfrm>
+          <a:prstGeom prst="rect">
+            <a:avLst/>
+          </a:prstGeom>
+        </p:spPr>
+      </p:pic>
+      <p:pic>
+        <p:nvPicPr>
+          <p:cNvPr id="9" name="图片 8"/>
+          <p:cNvPicPr>
+            <a:picLocks noChangeAspect="1"/>
+          </p:cNvPicPr>
+          <p:nvPr/>
+        </p:nvPicPr>
+        <p:blipFill>
+          <a:blip r:embed="rId7"/>
+          <a:stretch>
+            <a:fillRect/>
+          </a:stretch>
+        </p:blipFill>
+        <p:spPr>
+          <a:xfrm>
+            <a:off x="5997440" y="4690167"/>
+            <a:ext cx="2431650" cy="1830067"/>
           </a:xfrm>
           <a:prstGeom prst="rect">
             <a:avLst/>
@@ -3223,6 +3509,30 @@
       </p:sp>
       <p:pic>
         <p:nvPicPr>
+          <p:cNvPr id="7" name="图片 6"/>
+          <p:cNvPicPr>
+            <a:picLocks noChangeAspect="1"/>
+          </p:cNvPicPr>
+          <p:nvPr/>
+        </p:nvPicPr>
+        <p:blipFill>
+          <a:blip r:embed="rId2"/>
+          <a:stretch>
+            <a:fillRect/>
+          </a:stretch>
+        </p:blipFill>
+        <p:spPr>
+          <a:xfrm>
+            <a:off x="3120303" y="1698403"/>
+            <a:ext cx="2431650" cy="1830067"/>
+          </a:xfrm>
+          <a:prstGeom prst="rect">
+            <a:avLst/>
+          </a:prstGeom>
+        </p:spPr>
+      </p:pic>
+      <p:pic>
+        <p:nvPicPr>
           <p:cNvPr id="3" name="图片 2"/>
           <p:cNvPicPr>
             <a:picLocks noChangeAspect="1"/>
@@ -3230,21 +3540,63 @@
           <p:nvPr/>
         </p:nvPicPr>
         <p:blipFill>
-          <a:blip r:embed="rId2">
-            <a:extLst>
-              <a:ext uri="{28A0092B-C50C-407E-A947-70E740481C1C}">
-                <a14:useLocalDpi xmlns:a14="http://schemas.microsoft.com/office/drawing/2010/main" val="0"/>
-              </a:ext>
-            </a:extLst>
-          </a:blip>
+          <a:blip r:embed="rId3"/>
           <a:stretch>
             <a:fillRect/>
           </a:stretch>
         </p:blipFill>
         <p:spPr>
           <a:xfrm>
-            <a:off x="2467275" y="966787"/>
-            <a:ext cx="7315200" cy="5488335"/>
+            <a:off x="8943295" y="1695168"/>
+            <a:ext cx="2431650" cy="3666601"/>
+          </a:xfrm>
+          <a:prstGeom prst="rect">
+            <a:avLst/>
+          </a:prstGeom>
+        </p:spPr>
+      </p:pic>
+      <p:pic>
+        <p:nvPicPr>
+          <p:cNvPr id="10" name="图片 9"/>
+          <p:cNvPicPr>
+            <a:picLocks noChangeAspect="1"/>
+          </p:cNvPicPr>
+          <p:nvPr/>
+        </p:nvPicPr>
+        <p:blipFill>
+          <a:blip r:embed="rId4"/>
+          <a:stretch>
+            <a:fillRect/>
+          </a:stretch>
+        </p:blipFill>
+        <p:spPr>
+          <a:xfrm>
+            <a:off x="3120303" y="3528468"/>
+            <a:ext cx="4876201" cy="1830067"/>
+          </a:xfrm>
+          <a:prstGeom prst="rect">
+            <a:avLst/>
+          </a:prstGeom>
+        </p:spPr>
+      </p:pic>
+      <p:pic>
+        <p:nvPicPr>
+          <p:cNvPr id="2" name="图片 1"/>
+          <p:cNvPicPr>
+            <a:picLocks noChangeAspect="1"/>
+          </p:cNvPicPr>
+          <p:nvPr/>
+        </p:nvPicPr>
+        <p:blipFill>
+          <a:blip r:embed="rId5"/>
+          <a:stretch>
+            <a:fillRect/>
+          </a:stretch>
+        </p:blipFill>
+        <p:spPr>
+          <a:xfrm>
+            <a:off x="5551953" y="1698402"/>
+            <a:ext cx="2431650" cy="1830067"/>
           </a:xfrm>
           <a:prstGeom prst="rect">
             <a:avLst/>
@@ -3334,28 +3686,94 @@
       </p:sp>
       <p:pic>
         <p:nvPicPr>
-          <p:cNvPr id="3" name="图片 2"/>
+          <p:cNvPr id="2" name="图片 1"/>
           <p:cNvPicPr>
             <a:picLocks noChangeAspect="1"/>
           </p:cNvPicPr>
           <p:nvPr/>
         </p:nvPicPr>
         <p:blipFill>
-          <a:blip r:embed="rId2">
-            <a:extLst>
-              <a:ext uri="{28A0092B-C50C-407E-A947-70E740481C1C}">
-                <a14:useLocalDpi xmlns:a14="http://schemas.microsoft.com/office/drawing/2010/main" val="0"/>
-              </a:ext>
-            </a:extLst>
-          </a:blip>
+          <a:blip r:embed="rId2"/>
           <a:stretch>
             <a:fillRect/>
           </a:stretch>
         </p:blipFill>
         <p:spPr>
           <a:xfrm>
-            <a:off x="2467281" y="905241"/>
-            <a:ext cx="7315200" cy="5488335"/>
+            <a:off x="2752437" y="1159951"/>
+            <a:ext cx="3657600" cy="2752721"/>
+          </a:xfrm>
+          <a:prstGeom prst="rect">
+            <a:avLst/>
+          </a:prstGeom>
+        </p:spPr>
+      </p:pic>
+      <p:pic>
+        <p:nvPicPr>
+          <p:cNvPr id="4" name="图片 3"/>
+          <p:cNvPicPr>
+            <a:picLocks noChangeAspect="1"/>
+          </p:cNvPicPr>
+          <p:nvPr/>
+        </p:nvPicPr>
+        <p:blipFill>
+          <a:blip r:embed="rId3"/>
+          <a:stretch>
+            <a:fillRect/>
+          </a:stretch>
+        </p:blipFill>
+        <p:spPr>
+          <a:xfrm>
+            <a:off x="6335302" y="1159950"/>
+            <a:ext cx="3657600" cy="2752721"/>
+          </a:xfrm>
+          <a:prstGeom prst="rect">
+            <a:avLst/>
+          </a:prstGeom>
+        </p:spPr>
+      </p:pic>
+      <p:pic>
+        <p:nvPicPr>
+          <p:cNvPr id="5" name="图片 4"/>
+          <p:cNvPicPr>
+            <a:picLocks noChangeAspect="1"/>
+          </p:cNvPicPr>
+          <p:nvPr/>
+        </p:nvPicPr>
+        <p:blipFill>
+          <a:blip r:embed="rId4"/>
+          <a:stretch>
+            <a:fillRect/>
+          </a:stretch>
+        </p:blipFill>
+        <p:spPr>
+          <a:xfrm>
+            <a:off x="2775456" y="3912671"/>
+            <a:ext cx="3657600" cy="2752721"/>
+          </a:xfrm>
+          <a:prstGeom prst="rect">
+            <a:avLst/>
+          </a:prstGeom>
+        </p:spPr>
+      </p:pic>
+      <p:pic>
+        <p:nvPicPr>
+          <p:cNvPr id="6" name="图片 5"/>
+          <p:cNvPicPr>
+            <a:picLocks noChangeAspect="1"/>
+          </p:cNvPicPr>
+          <p:nvPr/>
+        </p:nvPicPr>
+        <p:blipFill>
+          <a:blip r:embed="rId5"/>
+          <a:stretch>
+            <a:fillRect/>
+          </a:stretch>
+        </p:blipFill>
+        <p:spPr>
+          <a:xfrm>
+            <a:off x="6312283" y="3912671"/>
+            <a:ext cx="3657600" cy="2752721"/>
           </a:xfrm>
           <a:prstGeom prst="rect">
             <a:avLst/>
@@ -3445,28 +3863,94 @@
       </p:sp>
       <p:pic>
         <p:nvPicPr>
-          <p:cNvPr id="2" name="图片 1"/>
+          <p:cNvPr id="3" name="图片 2"/>
           <p:cNvPicPr>
             <a:picLocks noChangeAspect="1"/>
           </p:cNvPicPr>
           <p:nvPr/>
         </p:nvPicPr>
         <p:blipFill>
-          <a:blip r:embed="rId2">
-            <a:extLst>
-              <a:ext uri="{28A0092B-C50C-407E-A947-70E740481C1C}">
-                <a14:useLocalDpi xmlns:a14="http://schemas.microsoft.com/office/drawing/2010/main" val="0"/>
-              </a:ext>
-            </a:extLst>
-          </a:blip>
+          <a:blip r:embed="rId2"/>
           <a:stretch>
             <a:fillRect/>
           </a:stretch>
         </p:blipFill>
         <p:spPr>
           <a:xfrm>
-            <a:off x="2467283" y="861279"/>
-            <a:ext cx="7315200" cy="5488335"/>
+            <a:off x="2304029" y="1089612"/>
+            <a:ext cx="3657600" cy="2752721"/>
+          </a:xfrm>
+          <a:prstGeom prst="rect">
+            <a:avLst/>
+          </a:prstGeom>
+        </p:spPr>
+      </p:pic>
+      <p:pic>
+        <p:nvPicPr>
+          <p:cNvPr id="4" name="图片 3"/>
+          <p:cNvPicPr>
+            <a:picLocks noChangeAspect="1"/>
+          </p:cNvPicPr>
+          <p:nvPr/>
+        </p:nvPicPr>
+        <p:blipFill>
+          <a:blip r:embed="rId3"/>
+          <a:stretch>
+            <a:fillRect/>
+          </a:stretch>
+        </p:blipFill>
+        <p:spPr>
+          <a:xfrm>
+            <a:off x="6225398" y="1089611"/>
+            <a:ext cx="3657600" cy="2752721"/>
+          </a:xfrm>
+          <a:prstGeom prst="rect">
+            <a:avLst/>
+          </a:prstGeom>
+        </p:spPr>
+      </p:pic>
+      <p:pic>
+        <p:nvPicPr>
+          <p:cNvPr id="5" name="图片 4"/>
+          <p:cNvPicPr>
+            <a:picLocks noChangeAspect="1"/>
+          </p:cNvPicPr>
+          <p:nvPr/>
+        </p:nvPicPr>
+        <p:blipFill>
+          <a:blip r:embed="rId4"/>
+          <a:stretch>
+            <a:fillRect/>
+          </a:stretch>
+        </p:blipFill>
+        <p:spPr>
+          <a:xfrm>
+            <a:off x="2304029" y="3920735"/>
+            <a:ext cx="3657600" cy="2752721"/>
+          </a:xfrm>
+          <a:prstGeom prst="rect">
+            <a:avLst/>
+          </a:prstGeom>
+        </p:spPr>
+      </p:pic>
+      <p:pic>
+        <p:nvPicPr>
+          <p:cNvPr id="6" name="图片 5"/>
+          <p:cNvPicPr>
+            <a:picLocks noChangeAspect="1"/>
+          </p:cNvPicPr>
+          <p:nvPr/>
+        </p:nvPicPr>
+        <p:blipFill>
+          <a:blip r:embed="rId5"/>
+          <a:stretch>
+            <a:fillRect/>
+          </a:stretch>
+        </p:blipFill>
+        <p:spPr>
+          <a:xfrm>
+            <a:off x="6225398" y="3920734"/>
+            <a:ext cx="3657600" cy="2752721"/>
           </a:xfrm>
           <a:prstGeom prst="rect">
             <a:avLst/>
@@ -3549,7 +4033,7 @@
       </p:sp>
       <p:pic>
         <p:nvPicPr>
-          <p:cNvPr id="2" name="图片 1"/>
+          <p:cNvPr id="3" name="图片 2"/>
           <p:cNvPicPr>
             <a:picLocks noChangeAspect="1"/>
           </p:cNvPicPr>
@@ -3563,8 +4047,8 @@
         </p:blipFill>
         <p:spPr>
           <a:xfrm>
-            <a:off x="265325" y="3827728"/>
-            <a:ext cx="2743200" cy="2064541"/>
+            <a:off x="1380842" y="1458888"/>
+            <a:ext cx="2431650" cy="1830067"/>
           </a:xfrm>
           <a:prstGeom prst="rect">
             <a:avLst/>
@@ -3573,7 +4057,7 @@
       </p:pic>
       <p:pic>
         <p:nvPicPr>
-          <p:cNvPr id="4" name="图片 3"/>
+          <p:cNvPr id="11" name="图片 10"/>
           <p:cNvPicPr>
             <a:picLocks noChangeAspect="1"/>
           </p:cNvPicPr>
@@ -3587,8 +4071,8 @@
         </p:blipFill>
         <p:spPr>
           <a:xfrm>
-            <a:off x="3112195" y="3827727"/>
-            <a:ext cx="2743200" cy="2064541"/>
+            <a:off x="3961173" y="1458888"/>
+            <a:ext cx="2431650" cy="1830067"/>
           </a:xfrm>
           <a:prstGeom prst="rect">
             <a:avLst/>
@@ -3597,7 +4081,7 @@
       </p:pic>
       <p:pic>
         <p:nvPicPr>
-          <p:cNvPr id="5" name="图片 4"/>
+          <p:cNvPr id="12" name="图片 11"/>
           <p:cNvPicPr>
             <a:picLocks noChangeAspect="1"/>
           </p:cNvPicPr>
@@ -3611,8 +4095,8 @@
         </p:blipFill>
         <p:spPr>
           <a:xfrm>
-            <a:off x="5959065" y="3827726"/>
-            <a:ext cx="2743200" cy="2064541"/>
+            <a:off x="1380842" y="3611737"/>
+            <a:ext cx="2431650" cy="1830067"/>
           </a:xfrm>
           <a:prstGeom prst="rect">
             <a:avLst/>
@@ -3621,7 +4105,7 @@
       </p:pic>
       <p:pic>
         <p:nvPicPr>
-          <p:cNvPr id="6" name="图片 5"/>
+          <p:cNvPr id="13" name="图片 12"/>
           <p:cNvPicPr>
             <a:picLocks noChangeAspect="1"/>
           </p:cNvPicPr>
@@ -3635,80 +4119,8 @@
         </p:blipFill>
         <p:spPr>
           <a:xfrm>
-            <a:off x="1415279" y="1441098"/>
-            <a:ext cx="2743200" cy="2064541"/>
-          </a:xfrm>
-          <a:prstGeom prst="rect">
-            <a:avLst/>
-          </a:prstGeom>
-        </p:spPr>
-      </p:pic>
-      <p:pic>
-        <p:nvPicPr>
-          <p:cNvPr id="8" name="图片 7"/>
-          <p:cNvPicPr>
-            <a:picLocks noChangeAspect="1"/>
-          </p:cNvPicPr>
-          <p:nvPr/>
-        </p:nvPicPr>
-        <p:blipFill>
-          <a:blip r:embed="rId6"/>
-          <a:stretch>
-            <a:fillRect/>
-          </a:stretch>
-        </p:blipFill>
-        <p:spPr>
-          <a:xfrm>
-            <a:off x="9133108" y="1312437"/>
-            <a:ext cx="2743200" cy="2064541"/>
-          </a:xfrm>
-          <a:prstGeom prst="rect">
-            <a:avLst/>
-          </a:prstGeom>
-        </p:spPr>
-      </p:pic>
-      <p:pic>
-        <p:nvPicPr>
-          <p:cNvPr id="9" name="图片 8"/>
-          <p:cNvPicPr>
-            <a:picLocks noChangeAspect="1"/>
-          </p:cNvPicPr>
-          <p:nvPr/>
-        </p:nvPicPr>
-        <p:blipFill>
-          <a:blip r:embed="rId7"/>
-          <a:stretch>
-            <a:fillRect/>
-          </a:stretch>
-        </p:blipFill>
-        <p:spPr>
-          <a:xfrm>
-            <a:off x="9133108" y="3760610"/>
-            <a:ext cx="2743200" cy="2064541"/>
-          </a:xfrm>
-          <a:prstGeom prst="rect">
-            <a:avLst/>
-          </a:prstGeom>
-        </p:spPr>
-      </p:pic>
-      <p:pic>
-        <p:nvPicPr>
-          <p:cNvPr id="10" name="图片 9"/>
-          <p:cNvPicPr>
-            <a:picLocks noChangeAspect="1"/>
-          </p:cNvPicPr>
-          <p:nvPr/>
-        </p:nvPicPr>
-        <p:blipFill>
-          <a:blip r:embed="rId8"/>
-          <a:stretch>
-            <a:fillRect/>
-          </a:stretch>
-        </p:blipFill>
-        <p:spPr>
-          <a:xfrm>
-            <a:off x="4587465" y="1441099"/>
-            <a:ext cx="2743200" cy="2064541"/>
+            <a:off x="3961173" y="3611736"/>
+            <a:ext cx="2431650" cy="1830067"/>
           </a:xfrm>
           <a:prstGeom prst="rect">
             <a:avLst/>
@@ -3753,8 +4165,8 @@
         </p:nvSpPr>
         <p:spPr>
           <a:xfrm>
-            <a:off x="1685210" y="394448"/>
-            <a:ext cx="8879355" cy="369332"/>
+            <a:off x="1745066" y="394448"/>
+            <a:ext cx="8759642" cy="369332"/>
           </a:xfrm>
           <a:prstGeom prst="rect">
             <a:avLst/>
@@ -3780,7 +4192,7 @@
                 <a:latin typeface="Arial" panose="020B0604020202020204" pitchFamily="34" charset="0"/>
                 <a:cs typeface="Arial" panose="020B0604020202020204" pitchFamily="34" charset="0"/>
               </a:rPr>
-              <a:t>. - HSV</a:t>
+              <a:t>. - IAV</a:t>
             </a:r>
             <a:endParaRPr lang="zh-CN" altLang="en-US" dirty="0">
               <a:latin typeface="Arial" panose="020B0604020202020204" pitchFamily="34" charset="0"/>
@@ -3791,7 +4203,7 @@
       </p:sp>
       <p:pic>
         <p:nvPicPr>
-          <p:cNvPr id="2" name="图片 1"/>
+          <p:cNvPr id="14" name="图片 13"/>
           <p:cNvPicPr>
             <a:picLocks noChangeAspect="1"/>
           </p:cNvPicPr>
@@ -3805,8 +4217,8 @@
         </p:blipFill>
         <p:spPr>
           <a:xfrm>
-            <a:off x="2151202" y="1172775"/>
-            <a:ext cx="3657600" cy="2752721"/>
+            <a:off x="2602550" y="1564396"/>
+            <a:ext cx="2431650" cy="1830067"/>
           </a:xfrm>
           <a:prstGeom prst="rect">
             <a:avLst/>
@@ -3815,7 +4227,7 @@
       </p:pic>
       <p:pic>
         <p:nvPicPr>
-          <p:cNvPr id="3" name="图片 2"/>
+          <p:cNvPr id="15" name="图片 14"/>
           <p:cNvPicPr>
             <a:picLocks noChangeAspect="1"/>
           </p:cNvPicPr>
@@ -3829,8 +4241,8 @@
         </p:blipFill>
         <p:spPr>
           <a:xfrm>
-            <a:off x="6366075" y="1172775"/>
-            <a:ext cx="3657600" cy="2752721"/>
+            <a:off x="2602550" y="3717244"/>
+            <a:ext cx="2431650" cy="1830067"/>
           </a:xfrm>
           <a:prstGeom prst="rect">
             <a:avLst/>
@@ -3839,7 +4251,7 @@
       </p:pic>
       <p:pic>
         <p:nvPicPr>
-          <p:cNvPr id="4" name="图片 3"/>
+          <p:cNvPr id="16" name="图片 15"/>
           <p:cNvPicPr>
             <a:picLocks noChangeAspect="1"/>
           </p:cNvPicPr>
@@ -3853,8 +4265,8 @@
         </p:blipFill>
         <p:spPr>
           <a:xfrm>
-            <a:off x="2151202" y="3925496"/>
-            <a:ext cx="3657600" cy="2752721"/>
+            <a:off x="5182881" y="1564396"/>
+            <a:ext cx="2431650" cy="1830067"/>
           </a:xfrm>
           <a:prstGeom prst="rect">
             <a:avLst/>
@@ -3863,7 +4275,7 @@
       </p:pic>
       <p:pic>
         <p:nvPicPr>
-          <p:cNvPr id="5" name="图片 4"/>
+          <p:cNvPr id="17" name="图片 16"/>
           <p:cNvPicPr>
             <a:picLocks noChangeAspect="1"/>
           </p:cNvPicPr>
@@ -3877,8 +4289,8 @@
         </p:blipFill>
         <p:spPr>
           <a:xfrm>
-            <a:off x="6366075" y="3925495"/>
-            <a:ext cx="3657600" cy="2752721"/>
+            <a:off x="5182881" y="3717243"/>
+            <a:ext cx="2431650" cy="1830067"/>
           </a:xfrm>
           <a:prstGeom prst="rect">
             <a:avLst/>
@@ -3888,7 +4300,7 @@
     </p:spTree>
     <p:extLst>
       <p:ext uri="{BB962C8B-B14F-4D97-AF65-F5344CB8AC3E}">
-        <p14:creationId xmlns:p14="http://schemas.microsoft.com/office/powerpoint/2010/main" val="198124722"/>
+        <p14:creationId xmlns:p14="http://schemas.microsoft.com/office/powerpoint/2010/main" val="3567981220"/>
       </p:ext>
     </p:extLst>
   </p:cSld>
@@ -3923,8 +4335,8 @@
         </p:nvSpPr>
         <p:spPr>
           <a:xfrm>
-            <a:off x="1236371" y="394448"/>
-            <a:ext cx="9777036" cy="369332"/>
+            <a:off x="1685210" y="394448"/>
+            <a:ext cx="8879355" cy="369332"/>
           </a:xfrm>
           <a:prstGeom prst="rect">
             <a:avLst/>
@@ -3943,14 +4355,28 @@
                 <a:latin typeface="Arial" panose="020B0604020202020204" pitchFamily="34" charset="0"/>
                 <a:cs typeface="Arial" panose="020B0604020202020204" pitchFamily="34" charset="0"/>
               </a:rPr>
-              <a:t>Figure 6. Disturbances in the circadian clock lead to worse infection outcomes</a:t>
+              <a:t>Figure </a:t>
             </a:r>
             <a:r>
               <a:rPr lang="en-US" altLang="zh-CN" dirty="0" smtClean="0">
                 <a:latin typeface="Arial" panose="020B0604020202020204" pitchFamily="34" charset="0"/>
                 <a:cs typeface="Arial" panose="020B0604020202020204" pitchFamily="34" charset="0"/>
               </a:rPr>
-              <a:t>. – SARS-Cov-2</a:t>
+              <a:t>8. </a:t>
+            </a:r>
+            <a:r>
+              <a:rPr lang="en-US" altLang="zh-CN" dirty="0">
+                <a:latin typeface="Arial" panose="020B0604020202020204" pitchFamily="34" charset="0"/>
+                <a:cs typeface="Arial" panose="020B0604020202020204" pitchFamily="34" charset="0"/>
+              </a:rPr>
+              <a:t>Disturbances in the circadian clock lead to worse infection outcomes</a:t>
+            </a:r>
+            <a:r>
+              <a:rPr lang="en-US" altLang="zh-CN" dirty="0" smtClean="0">
+                <a:latin typeface="Arial" panose="020B0604020202020204" pitchFamily="34" charset="0"/>
+                <a:cs typeface="Arial" panose="020B0604020202020204" pitchFamily="34" charset="0"/>
+              </a:rPr>
+              <a:t>. - HSV</a:t>
             </a:r>
             <a:endParaRPr lang="zh-CN" altLang="en-US" dirty="0">
               <a:latin typeface="Arial" panose="020B0604020202020204" pitchFamily="34" charset="0"/>
@@ -3961,7 +4387,7 @@
       </p:sp>
       <p:pic>
         <p:nvPicPr>
-          <p:cNvPr id="2" name="图片 1"/>
+          <p:cNvPr id="6" name="图片 5"/>
           <p:cNvPicPr>
             <a:picLocks noChangeAspect="1"/>
           </p:cNvPicPr>
@@ -3975,7 +4401,7 @@
         </p:blipFill>
         <p:spPr>
           <a:xfrm>
-            <a:off x="2374367" y="1072028"/>
+            <a:off x="2295236" y="1195120"/>
             <a:ext cx="3657600" cy="2752721"/>
           </a:xfrm>
           <a:prstGeom prst="rect">
@@ -3985,7 +4411,7 @@
       </p:pic>
       <p:pic>
         <p:nvPicPr>
-          <p:cNvPr id="3" name="图片 2"/>
+          <p:cNvPr id="8" name="图片 7"/>
           <p:cNvPicPr>
             <a:picLocks noChangeAspect="1"/>
           </p:cNvPicPr>
@@ -3999,7 +4425,7 @@
         </p:blipFill>
         <p:spPr>
           <a:xfrm>
-            <a:off x="6462790" y="1072028"/>
+            <a:off x="6181438" y="1195120"/>
             <a:ext cx="3657600" cy="2752721"/>
           </a:xfrm>
           <a:prstGeom prst="rect">
@@ -4009,7 +4435,7 @@
       </p:pic>
       <p:pic>
         <p:nvPicPr>
-          <p:cNvPr id="4" name="图片 3"/>
+          <p:cNvPr id="11" name="图片 10"/>
           <p:cNvPicPr>
             <a:picLocks noChangeAspect="1"/>
           </p:cNvPicPr>
@@ -4023,7 +4449,7 @@
         </p:blipFill>
         <p:spPr>
           <a:xfrm>
-            <a:off x="2374367" y="3974640"/>
+            <a:off x="2409537" y="3947841"/>
             <a:ext cx="3657600" cy="2752721"/>
           </a:xfrm>
           <a:prstGeom prst="rect">
@@ -4033,7 +4459,7 @@
       </p:pic>
       <p:pic>
         <p:nvPicPr>
-          <p:cNvPr id="5" name="图片 4"/>
+          <p:cNvPr id="12" name="图片 11"/>
           <p:cNvPicPr>
             <a:picLocks noChangeAspect="1"/>
           </p:cNvPicPr>
@@ -4047,7 +4473,7 @@
         </p:blipFill>
         <p:spPr>
           <a:xfrm>
-            <a:off x="6462790" y="3974639"/>
+            <a:off x="6067137" y="3947841"/>
             <a:ext cx="3657600" cy="2752721"/>
           </a:xfrm>
           <a:prstGeom prst="rect">
@@ -4058,7 +4484,177 @@
     </p:spTree>
     <p:extLst>
       <p:ext uri="{BB962C8B-B14F-4D97-AF65-F5344CB8AC3E}">
-        <p14:creationId xmlns:p14="http://schemas.microsoft.com/office/powerpoint/2010/main" val="4038387648"/>
+        <p14:creationId xmlns:p14="http://schemas.microsoft.com/office/powerpoint/2010/main" val="198124722"/>
+      </p:ext>
+    </p:extLst>
+  </p:cSld>
+  <p:clrMapOvr>
+    <a:masterClrMapping/>
+  </p:clrMapOvr>
+</p:sld>
+</file>
+
+<file path=ppt/slides/slide9.xml><?xml version="1.0" encoding="utf-8"?>
+<p:sld xmlns:a="http://schemas.openxmlformats.org/drawingml/2006/main" xmlns:r="http://schemas.openxmlformats.org/officeDocument/2006/relationships" xmlns:p="http://schemas.openxmlformats.org/presentationml/2006/main">
+  <p:cSld>
+    <p:spTree>
+      <p:nvGrpSpPr>
+        <p:cNvPr id="1" name=""/>
+        <p:cNvGrpSpPr/>
+        <p:nvPr/>
+      </p:nvGrpSpPr>
+      <p:grpSpPr>
+        <a:xfrm>
+          <a:off x="0" y="0"/>
+          <a:ext cx="0" cy="0"/>
+          <a:chOff x="0" y="0"/>
+          <a:chExt cx="0" cy="0"/>
+        </a:xfrm>
+      </p:grpSpPr>
+      <p:sp>
+        <p:nvSpPr>
+          <p:cNvPr id="7" name="文本框 6"/>
+          <p:cNvSpPr txBox="1"/>
+          <p:nvPr/>
+        </p:nvSpPr>
+        <p:spPr>
+          <a:xfrm>
+            <a:off x="1685210" y="394448"/>
+            <a:ext cx="8879355" cy="369332"/>
+          </a:xfrm>
+          <a:prstGeom prst="rect">
+            <a:avLst/>
+          </a:prstGeom>
+          <a:noFill/>
+        </p:spPr>
+        <p:txBody>
+          <a:bodyPr wrap="none" rtlCol="0">
+            <a:spAutoFit/>
+          </a:bodyPr>
+          <a:lstStyle/>
+          <a:p>
+            <a:pPr algn="ctr"/>
+            <a:r>
+              <a:rPr lang="en-US" altLang="zh-CN" dirty="0">
+                <a:latin typeface="Arial" panose="020B0604020202020204" pitchFamily="34" charset="0"/>
+                <a:cs typeface="Arial" panose="020B0604020202020204" pitchFamily="34" charset="0"/>
+              </a:rPr>
+              <a:t>Figure 6. Disturbances in the circadian clock lead to worse infection outcomes</a:t>
+            </a:r>
+            <a:r>
+              <a:rPr lang="en-US" altLang="zh-CN" dirty="0" smtClean="0">
+                <a:latin typeface="Arial" panose="020B0604020202020204" pitchFamily="34" charset="0"/>
+                <a:cs typeface="Arial" panose="020B0604020202020204" pitchFamily="34" charset="0"/>
+              </a:rPr>
+              <a:t>. - HSV</a:t>
+            </a:r>
+            <a:endParaRPr lang="zh-CN" altLang="en-US" dirty="0">
+              <a:latin typeface="Arial" panose="020B0604020202020204" pitchFamily="34" charset="0"/>
+              <a:cs typeface="Arial" panose="020B0604020202020204" pitchFamily="34" charset="0"/>
+            </a:endParaRPr>
+          </a:p>
+        </p:txBody>
+      </p:sp>
+      <p:pic>
+        <p:nvPicPr>
+          <p:cNvPr id="6" name="图片 5"/>
+          <p:cNvPicPr>
+            <a:picLocks noChangeAspect="1"/>
+          </p:cNvPicPr>
+          <p:nvPr/>
+        </p:nvPicPr>
+        <p:blipFill>
+          <a:blip r:embed="rId2"/>
+          <a:stretch>
+            <a:fillRect/>
+          </a:stretch>
+        </p:blipFill>
+        <p:spPr>
+          <a:xfrm>
+            <a:off x="2295236" y="1195120"/>
+            <a:ext cx="3657600" cy="2752721"/>
+          </a:xfrm>
+          <a:prstGeom prst="rect">
+            <a:avLst/>
+          </a:prstGeom>
+        </p:spPr>
+      </p:pic>
+      <p:pic>
+        <p:nvPicPr>
+          <p:cNvPr id="8" name="图片 7"/>
+          <p:cNvPicPr>
+            <a:picLocks noChangeAspect="1"/>
+          </p:cNvPicPr>
+          <p:nvPr/>
+        </p:nvPicPr>
+        <p:blipFill>
+          <a:blip r:embed="rId3"/>
+          <a:stretch>
+            <a:fillRect/>
+          </a:stretch>
+        </p:blipFill>
+        <p:spPr>
+          <a:xfrm>
+            <a:off x="6181438" y="1195120"/>
+            <a:ext cx="3657600" cy="2752721"/>
+          </a:xfrm>
+          <a:prstGeom prst="rect">
+            <a:avLst/>
+          </a:prstGeom>
+        </p:spPr>
+      </p:pic>
+      <p:pic>
+        <p:nvPicPr>
+          <p:cNvPr id="9" name="图片 8"/>
+          <p:cNvPicPr>
+            <a:picLocks noChangeAspect="1"/>
+          </p:cNvPicPr>
+          <p:nvPr/>
+        </p:nvPicPr>
+        <p:blipFill>
+          <a:blip r:embed="rId4"/>
+          <a:stretch>
+            <a:fillRect/>
+          </a:stretch>
+        </p:blipFill>
+        <p:spPr>
+          <a:xfrm>
+            <a:off x="2295236" y="4026243"/>
+            <a:ext cx="3657600" cy="2752721"/>
+          </a:xfrm>
+          <a:prstGeom prst="rect">
+            <a:avLst/>
+          </a:prstGeom>
+        </p:spPr>
+      </p:pic>
+      <p:pic>
+        <p:nvPicPr>
+          <p:cNvPr id="10" name="图片 9"/>
+          <p:cNvPicPr>
+            <a:picLocks noChangeAspect="1"/>
+          </p:cNvPicPr>
+          <p:nvPr/>
+        </p:nvPicPr>
+        <p:blipFill>
+          <a:blip r:embed="rId5"/>
+          <a:stretch>
+            <a:fillRect/>
+          </a:stretch>
+        </p:blipFill>
+        <p:spPr>
+          <a:xfrm>
+            <a:off x="6181438" y="4026242"/>
+            <a:ext cx="3657600" cy="2752721"/>
+          </a:xfrm>
+          <a:prstGeom prst="rect">
+            <a:avLst/>
+          </a:prstGeom>
+        </p:spPr>
+      </p:pic>
+    </p:spTree>
+    <p:extLst>
+      <p:ext uri="{BB962C8B-B14F-4D97-AF65-F5344CB8AC3E}">
+        <p14:creationId xmlns:p14="http://schemas.microsoft.com/office/powerpoint/2010/main" val="2993212211"/>
       </p:ext>
     </p:extLst>
   </p:cSld>

</xml_diff>

<commit_message>
add four figures in Fig3
</commit_message>
<xml_diff>
--- a/Figures/figures.pptx
+++ b/Figures/figures.pptx
@@ -248,7 +248,7 @@
           <a:p>
             <a:fld id="{E0B8E1AC-92D5-41B2-8B41-6A01DF117C07}" type="datetimeFigureOut">
               <a:rPr lang="zh-CN" altLang="en-US" smtClean="0"/>
-              <a:t>2023/1/28</a:t>
+              <a:t>2023/2/6</a:t>
             </a:fld>
             <a:endParaRPr lang="zh-CN" altLang="en-US"/>
           </a:p>
@@ -416,7 +416,7 @@
           <a:p>
             <a:fld id="{E0B8E1AC-92D5-41B2-8B41-6A01DF117C07}" type="datetimeFigureOut">
               <a:rPr lang="zh-CN" altLang="en-US" smtClean="0"/>
-              <a:t>2023/1/28</a:t>
+              <a:t>2023/2/6</a:t>
             </a:fld>
             <a:endParaRPr lang="zh-CN" altLang="en-US"/>
           </a:p>
@@ -594,7 +594,7 @@
           <a:p>
             <a:fld id="{E0B8E1AC-92D5-41B2-8B41-6A01DF117C07}" type="datetimeFigureOut">
               <a:rPr lang="zh-CN" altLang="en-US" smtClean="0"/>
-              <a:t>2023/1/28</a:t>
+              <a:t>2023/2/6</a:t>
             </a:fld>
             <a:endParaRPr lang="zh-CN" altLang="en-US"/>
           </a:p>
@@ -762,7 +762,7 @@
           <a:p>
             <a:fld id="{E0B8E1AC-92D5-41B2-8B41-6A01DF117C07}" type="datetimeFigureOut">
               <a:rPr lang="zh-CN" altLang="en-US" smtClean="0"/>
-              <a:t>2023/1/28</a:t>
+              <a:t>2023/2/6</a:t>
             </a:fld>
             <a:endParaRPr lang="zh-CN" altLang="en-US"/>
           </a:p>
@@ -1007,7 +1007,7 @@
           <a:p>
             <a:fld id="{E0B8E1AC-92D5-41B2-8B41-6A01DF117C07}" type="datetimeFigureOut">
               <a:rPr lang="zh-CN" altLang="en-US" smtClean="0"/>
-              <a:t>2023/1/28</a:t>
+              <a:t>2023/2/6</a:t>
             </a:fld>
             <a:endParaRPr lang="zh-CN" altLang="en-US"/>
           </a:p>
@@ -1236,7 +1236,7 @@
           <a:p>
             <a:fld id="{E0B8E1AC-92D5-41B2-8B41-6A01DF117C07}" type="datetimeFigureOut">
               <a:rPr lang="zh-CN" altLang="en-US" smtClean="0"/>
-              <a:t>2023/1/28</a:t>
+              <a:t>2023/2/6</a:t>
             </a:fld>
             <a:endParaRPr lang="zh-CN" altLang="en-US"/>
           </a:p>
@@ -1600,7 +1600,7 @@
           <a:p>
             <a:fld id="{E0B8E1AC-92D5-41B2-8B41-6A01DF117C07}" type="datetimeFigureOut">
               <a:rPr lang="zh-CN" altLang="en-US" smtClean="0"/>
-              <a:t>2023/1/28</a:t>
+              <a:t>2023/2/6</a:t>
             </a:fld>
             <a:endParaRPr lang="zh-CN" altLang="en-US"/>
           </a:p>
@@ -1717,7 +1717,7 @@
           <a:p>
             <a:fld id="{E0B8E1AC-92D5-41B2-8B41-6A01DF117C07}" type="datetimeFigureOut">
               <a:rPr lang="zh-CN" altLang="en-US" smtClean="0"/>
-              <a:t>2023/1/28</a:t>
+              <a:t>2023/2/6</a:t>
             </a:fld>
             <a:endParaRPr lang="zh-CN" altLang="en-US"/>
           </a:p>
@@ -1812,7 +1812,7 @@
           <a:p>
             <a:fld id="{E0B8E1AC-92D5-41B2-8B41-6A01DF117C07}" type="datetimeFigureOut">
               <a:rPr lang="zh-CN" altLang="en-US" smtClean="0"/>
-              <a:t>2023/1/28</a:t>
+              <a:t>2023/2/6</a:t>
             </a:fld>
             <a:endParaRPr lang="zh-CN" altLang="en-US"/>
           </a:p>
@@ -2087,7 +2087,7 @@
           <a:p>
             <a:fld id="{E0B8E1AC-92D5-41B2-8B41-6A01DF117C07}" type="datetimeFigureOut">
               <a:rPr lang="zh-CN" altLang="en-US" smtClean="0"/>
-              <a:t>2023/1/28</a:t>
+              <a:t>2023/2/6</a:t>
             </a:fld>
             <a:endParaRPr lang="zh-CN" altLang="en-US"/>
           </a:p>
@@ -2339,7 +2339,7 @@
           <a:p>
             <a:fld id="{E0B8E1AC-92D5-41B2-8B41-6A01DF117C07}" type="datetimeFigureOut">
               <a:rPr lang="zh-CN" altLang="en-US" smtClean="0"/>
-              <a:t>2023/1/28</a:t>
+              <a:t>2023/2/6</a:t>
             </a:fld>
             <a:endParaRPr lang="zh-CN" altLang="en-US"/>
           </a:p>
@@ -2550,7 +2550,7 @@
           <a:p>
             <a:fld id="{E0B8E1AC-92D5-41B2-8B41-6A01DF117C07}" type="datetimeFigureOut">
               <a:rPr lang="zh-CN" altLang="en-US" smtClean="0"/>
-              <a:t>2023/1/28</a:t>
+              <a:t>2023/2/6</a:t>
             </a:fld>
             <a:endParaRPr lang="zh-CN" altLang="en-US"/>
           </a:p>
@@ -3001,7 +3001,7 @@
       </p:sp>
       <p:pic>
         <p:nvPicPr>
-          <p:cNvPr id="3" name="图片 2"/>
+          <p:cNvPr id="2" name="图片 1"/>
           <p:cNvPicPr>
             <a:picLocks noChangeAspect="1"/>
           </p:cNvPicPr>

</xml_diff>